<commit_message>
Computer Vision: The Object Detection Dataset
</commit_message>
<xml_diff>
--- a/Dive into Deep Learning/12. The Object Detection Dataset-CH.pptx
+++ b/Dive into Deep Learning/12. The Object Detection Dataset-CH.pptx
@@ -205,7 +205,7 @@
           <a:p>
             <a:fld id="{0D3578DB-0091-4EF0-9620-E708B7FBB15F}" type="datetimeFigureOut">
               <a:rPr lang="en-US" smtClean="0"/>
-              <a:t>12/2/2019</a:t>
+              <a:t>12/7/2019</a:t>
             </a:fld>
             <a:endParaRPr lang="en-US"/>
           </a:p>
@@ -1747,7 +1747,7 @@
           <a:p>
             <a:fld id="{23EC023D-B61A-4551-8136-DCD5A45A20F2}" type="datetimeFigureOut">
               <a:rPr lang="en-US" smtClean="0"/>
-              <a:t>12/2/2019</a:t>
+              <a:t>12/7/2019</a:t>
             </a:fld>
             <a:endParaRPr lang="en-US"/>
           </a:p>
@@ -1945,7 +1945,7 @@
           <a:p>
             <a:fld id="{23EC023D-B61A-4551-8136-DCD5A45A20F2}" type="datetimeFigureOut">
               <a:rPr lang="en-US" smtClean="0"/>
-              <a:t>12/2/2019</a:t>
+              <a:t>12/7/2019</a:t>
             </a:fld>
             <a:endParaRPr lang="en-US"/>
           </a:p>
@@ -2153,7 +2153,7 @@
           <a:p>
             <a:fld id="{23EC023D-B61A-4551-8136-DCD5A45A20F2}" type="datetimeFigureOut">
               <a:rPr lang="en-US" smtClean="0"/>
-              <a:t>12/2/2019</a:t>
+              <a:t>12/7/2019</a:t>
             </a:fld>
             <a:endParaRPr lang="en-US"/>
           </a:p>
@@ -4263,7 +4263,7 @@
           <a:p>
             <a:fld id="{23EC023D-B61A-4551-8136-DCD5A45A20F2}" type="datetimeFigureOut">
               <a:rPr lang="en-US" smtClean="0"/>
-              <a:t>12/2/2019</a:t>
+              <a:t>12/7/2019</a:t>
             </a:fld>
             <a:endParaRPr lang="en-US"/>
           </a:p>
@@ -4538,7 +4538,7 @@
           <a:p>
             <a:fld id="{23EC023D-B61A-4551-8136-DCD5A45A20F2}" type="datetimeFigureOut">
               <a:rPr lang="en-US" smtClean="0"/>
-              <a:t>12/2/2019</a:t>
+              <a:t>12/7/2019</a:t>
             </a:fld>
             <a:endParaRPr lang="en-US"/>
           </a:p>
@@ -4803,7 +4803,7 @@
           <a:p>
             <a:fld id="{23EC023D-B61A-4551-8136-DCD5A45A20F2}" type="datetimeFigureOut">
               <a:rPr lang="en-US" smtClean="0"/>
-              <a:t>12/2/2019</a:t>
+              <a:t>12/7/2019</a:t>
             </a:fld>
             <a:endParaRPr lang="en-US"/>
           </a:p>
@@ -5215,7 +5215,7 @@
           <a:p>
             <a:fld id="{23EC023D-B61A-4551-8136-DCD5A45A20F2}" type="datetimeFigureOut">
               <a:rPr lang="en-US" smtClean="0"/>
-              <a:t>12/2/2019</a:t>
+              <a:t>12/7/2019</a:t>
             </a:fld>
             <a:endParaRPr lang="en-US"/>
           </a:p>
@@ -5356,7 +5356,7 @@
           <a:p>
             <a:fld id="{23EC023D-B61A-4551-8136-DCD5A45A20F2}" type="datetimeFigureOut">
               <a:rPr lang="en-US" smtClean="0"/>
-              <a:t>12/2/2019</a:t>
+              <a:t>12/7/2019</a:t>
             </a:fld>
             <a:endParaRPr lang="en-US"/>
           </a:p>
@@ -5469,7 +5469,7 @@
           <a:p>
             <a:fld id="{23EC023D-B61A-4551-8136-DCD5A45A20F2}" type="datetimeFigureOut">
               <a:rPr lang="en-US" smtClean="0"/>
-              <a:t>12/2/2019</a:t>
+              <a:t>12/7/2019</a:t>
             </a:fld>
             <a:endParaRPr lang="en-US"/>
           </a:p>
@@ -5780,7 +5780,7 @@
           <a:p>
             <a:fld id="{23EC023D-B61A-4551-8136-DCD5A45A20F2}" type="datetimeFigureOut">
               <a:rPr lang="en-US" smtClean="0"/>
-              <a:t>12/2/2019</a:t>
+              <a:t>12/7/2019</a:t>
             </a:fld>
             <a:endParaRPr lang="en-US"/>
           </a:p>
@@ -6068,7 +6068,7 @@
           <a:p>
             <a:fld id="{23EC023D-B61A-4551-8136-DCD5A45A20F2}" type="datetimeFigureOut">
               <a:rPr lang="en-US" smtClean="0"/>
-              <a:t>12/2/2019</a:t>
+              <a:t>12/7/2019</a:t>
             </a:fld>
             <a:endParaRPr lang="en-US"/>
           </a:p>
@@ -6309,7 +6309,7 @@
           <a:p>
             <a:fld id="{23EC023D-B61A-4551-8136-DCD5A45A20F2}" type="datetimeFigureOut">
               <a:rPr lang="en-US" smtClean="0"/>
-              <a:t>12/2/2019</a:t>
+              <a:t>12/7/2019</a:t>
             </a:fld>
             <a:endParaRPr lang="en-US"/>
           </a:p>
@@ -6805,8 +6805,12 @@
           <a:lstStyle/>
           <a:p>
             <a:r>
+              <a:rPr lang="zh-CN" altLang="en-US"/>
+              <a:t>计算机视觉：目</a:t>
+            </a:r>
+            <a:r>
               <a:rPr lang="zh-CN" altLang="en-US" dirty="0"/>
-              <a:t>目标检测数据集</a:t>
+              <a:t>标检测数据集</a:t>
             </a:r>
           </a:p>
         </p:txBody>

</xml_diff>